<commit_message>
Corrigidos pequenos pontos da apresentação. Versão incrementada de 0.9 para 1.0.
</commit_message>
<xml_diff>
--- a/apresentacao/apresentacao-sobreaviso-ga.pptx
+++ b/apresentacao/apresentacao-sobreaviso-ga.pptx
@@ -7340,9 +7340,10 @@
         <a:bodyPr/>
         <a:lstStyle/>
         <a:p>
+          <a:pPr algn="ctr"/>
           <a:r>
             <a:rPr lang="pt-BR" sz="2000" dirty="0"/>
-            <a:t>Chamaremos de escala o turno de cobertura realizada pelo funcionário, onde existe um horário de início e término.	</a:t>
+            <a:t>Escala é o turno de cobertura realizado pelo funcionário, onde existe um horário de início e de término.	</a:t>
           </a:r>
           <a:endParaRPr lang="en-US" sz="2000" dirty="0"/>
         </a:p>
@@ -7377,9 +7378,10 @@
         <a:bodyPr/>
         <a:lstStyle/>
         <a:p>
+          <a:pPr algn="ctr"/>
           <a:r>
             <a:rPr lang="pt-BR" sz="2000" dirty="0"/>
-            <a:t>Pode-se utilizar sobreaviso para todos os dias ou somente não úteis. A cobertura para dias úteis ocorre após o expediente.</a:t>
+            <a:t>Pode-se utilizar sobreaviso para todos os dias ou somente para os “não úteis”. A cobertura para dias úteis ocorre após o expediente.</a:t>
           </a:r>
           <a:endParaRPr lang="en-US" sz="2000" dirty="0"/>
         </a:p>
@@ -7422,7 +7424,7 @@
         <a:p>
           <a:r>
             <a:rPr lang="pt-BR" sz="2000" dirty="0"/>
-            <a:t>Gerar escala inicial através de rodizio, registrando bloqueios onde existir indisponibilidade. A geração não resolverá o bloqueio!</a:t>
+            <a:t>Gerar uma escala inicial através de rodízio, registrando bloqueios onde existir uma indisponibilidade. A geração não resolverá o bloqueio!</a:t>
           </a:r>
           <a:endParaRPr lang="en-US" sz="2600" dirty="0"/>
         </a:p>
@@ -7465,9 +7467,15 @@
             <a:rPr lang="pt-BR" sz="2600" dirty="0"/>
             <a:t> </a:t>
           </a:r>
+        </a:p>
+        <a:p>
+          <a:r>
+            <a:rPr lang="pt-BR" sz="2600" dirty="0"/>
+            <a:t>E</a:t>
+          </a:r>
           <a:r>
             <a:rPr lang="pt-BR" sz="2000" dirty="0"/>
-            <a:t>encontrar as substituições mais justas, levando em conta a disponibilidade da equipe para o dia do bloqueio e as regras de alocação.</a:t>
+            <a:t>ncontrar as substituições mais justas, levando em conta a disponibilidade da equipe para o dia do bloqueio e as regras de alocação.</a:t>
           </a:r>
           <a:endParaRPr lang="en-US" sz="2600" dirty="0"/>
         </a:p>
@@ -8268,10 +8276,10 @@
         <a:lstStyle/>
         <a:p>
           <a:r>
-            <a:rPr lang="pt-BR"/>
+            <a:rPr lang="pt-BR" dirty="0"/>
             <a:t>Dia comum - menor peso.</a:t>
           </a:r>
-          <a:endParaRPr lang="en-US"/>
+          <a:endParaRPr lang="en-US" dirty="0"/>
         </a:p>
       </dgm:t>
     </dgm:pt>
@@ -8490,13 +8498,42 @@
         <a:lstStyle/>
         <a:p>
           <a:r>
-            <a:rPr lang="pt-BR"/>
-            <a:t>Quanto menor o desvio padr</a:t>
+            <a:rPr lang="pt-BR" dirty="0"/>
+            <a:t>Quanto menor o desvio </a:t>
           </a:r>
           <a:r>
-            <a:rPr lang="en-US"/>
-            <a:t>ão mais justa é o conjunto de escalas</a:t>
+            <a:rPr lang="pt-BR" dirty="0" err="1"/>
+            <a:t>padr</a:t>
           </a:r>
+          <a:r>
+            <a:rPr lang="en-US" dirty="0" err="1"/>
+            <a:t>ão</a:t>
+          </a:r>
+          <a:r>
+            <a:rPr lang="en-US" dirty="0"/>
+            <a:t>, </a:t>
+          </a:r>
+          <a:r>
+            <a:rPr lang="en-US" dirty="0" err="1"/>
+            <a:t>mais</a:t>
+          </a:r>
+          <a:r>
+            <a:rPr lang="en-US" dirty="0"/>
+            <a:t> </a:t>
+          </a:r>
+          <a:r>
+            <a:rPr lang="en-US" dirty="0" err="1"/>
+            <a:t>justo</a:t>
+          </a:r>
+          <a:r>
+            <a:rPr lang="en-US" dirty="0"/>
+            <a:t> é o conjunto de </a:t>
+          </a:r>
+          <a:r>
+            <a:rPr lang="en-US" dirty="0" err="1"/>
+            <a:t>escalas</a:t>
+          </a:r>
+          <a:endParaRPr lang="en-US" dirty="0"/>
         </a:p>
       </dgm:t>
     </dgm:pt>
@@ -8754,7 +8791,7 @@
           </a:pPr>
           <a:r>
             <a:rPr lang="pt-BR" dirty="0"/>
-            <a:t>Pensamos que nesse caso deveria ser adicionada a média de horas trabalhadas até a data do seu ingresso na equipe, contudo esse problema não foi abordado.</a:t>
+            <a:t>	Pensamos que nesse caso deveria ser adicionada a média de horas trabalhadas até a data do seu ingresso na equipe ou ser calculada a escala a partir do momento da alteração da equipe, considerando o acumulado de horas de cada participante até o dado momento, contudo esse problema não foi abordado.</a:t>
           </a:r>
           <a:endParaRPr lang="en-US" dirty="0"/>
         </a:p>
@@ -8805,7 +8842,7 @@
       <dgm:spPr/>
     </dgm:pt>
     <dgm:pt modelId="{CB23C3A3-74EA-4369-907A-470D0D75A22C}" type="pres">
-      <dgm:prSet presAssocID="{E9DC0AA5-9597-49FF-8C77-52BB86140EAE}" presName="parentText" presStyleLbl="node1" presStyleIdx="1" presStyleCnt="3" custLinFactY="-31934" custLinFactNeighborY="-100000">
+      <dgm:prSet presAssocID="{E9DC0AA5-9597-49FF-8C77-52BB86140EAE}" presName="parentText" presStyleLbl="node1" presStyleIdx="1" presStyleCnt="3" custLinFactY="-16703" custLinFactNeighborY="-100000">
         <dgm:presLayoutVars>
           <dgm:chMax val="0"/>
           <dgm:bulletEnabled val="1"/>
@@ -8891,7 +8928,7 @@
           </a:pPr>
           <a:r>
             <a:rPr lang="pt-BR" sz="1400" dirty="0"/>
-            <a:t>Tenho dúvidas se a solução do nosso “case” seria melhor resolvida por algoritmos genéticos, contudo entendo que o resultado final atendeu nossas expectativas.</a:t>
+            <a:t>TEMOS dúvidas se a solução do nosso “case” seria melhor resolvida por algoritmos genéticos, contudo entendo que o resultado final atendeu nossas expectativas.</a:t>
           </a:r>
           <a:endParaRPr lang="en-US" sz="1400" dirty="0"/>
         </a:p>
@@ -9019,10 +9056,10 @@
             <a:defRPr cap="all"/>
           </a:pPr>
           <a:r>
-            <a:rPr lang="pt-BR"/>
-            <a:t>Espero que tenham gostado do trabalho, exigiu bastante esforço do grupo.</a:t>
+            <a:rPr lang="pt-BR" dirty="0"/>
+            <a:t>ESPERAMOS que tenham gostado do trabalho, exigiu bastante esforço do grupo.</a:t>
           </a:r>
-          <a:endParaRPr lang="en-US"/>
+          <a:endParaRPr lang="en-US" dirty="0"/>
         </a:p>
       </dgm:t>
     </dgm:pt>
@@ -10272,7 +10309,7 @@
           </a:pPr>
           <a:r>
             <a:rPr lang="pt-BR" sz="2000" kern="1200" dirty="0"/>
-            <a:t>Chamaremos de escala o turno de cobertura realizada pelo funcionário, onde existe um horário de início e término.	</a:t>
+            <a:t>Escala é o turno de cobertura realizado pelo funcionário, onde existe um horário de início e de término.	</a:t>
           </a:r>
           <a:endParaRPr lang="en-US" sz="2000" kern="1200" dirty="0"/>
         </a:p>
@@ -10372,7 +10409,7 @@
           </a:pPr>
           <a:r>
             <a:rPr lang="pt-BR" sz="2000" kern="1200" dirty="0"/>
-            <a:t>Pode-se utilizar sobreaviso para todos os dias ou somente não úteis. A cobertura para dias úteis ocorre após o expediente.</a:t>
+            <a:t>Pode-se utilizar sobreaviso para todos os dias ou somente para os “não úteis”. A cobertura para dias úteis ocorre após o expediente.</a:t>
           </a:r>
           <a:endParaRPr lang="en-US" sz="2000" kern="1200" dirty="0"/>
         </a:p>
@@ -10490,7 +10527,7 @@
           </a:pPr>
           <a:r>
             <a:rPr lang="pt-BR" sz="2000" kern="1200" dirty="0"/>
-            <a:t>Gerar escala inicial através de rodizio, registrando bloqueios onde existir indisponibilidade. A geração não resolverá o bloqueio!</a:t>
+            <a:t>Gerar uma escala inicial através de rodízio, registrando bloqueios onde existir uma indisponibilidade. A geração não resolverá o bloqueio!</a:t>
           </a:r>
           <a:endParaRPr lang="en-US" sz="2600" kern="1200" dirty="0"/>
         </a:p>
@@ -10596,9 +10633,27 @@
             <a:rPr lang="pt-BR" sz="2600" kern="1200" dirty="0"/>
             <a:t> </a:t>
           </a:r>
+        </a:p>
+        <a:p>
+          <a:pPr marL="0" lvl="0" indent="0" algn="ctr" defTabSz="1155700">
+            <a:lnSpc>
+              <a:spcPct val="90000"/>
+            </a:lnSpc>
+            <a:spcBef>
+              <a:spcPct val="0"/>
+            </a:spcBef>
+            <a:spcAft>
+              <a:spcPct val="35000"/>
+            </a:spcAft>
+            <a:buNone/>
+          </a:pPr>
+          <a:r>
+            <a:rPr lang="pt-BR" sz="2600" kern="1200" dirty="0"/>
+            <a:t>E</a:t>
+          </a:r>
           <a:r>
             <a:rPr lang="pt-BR" sz="2000" kern="1200" dirty="0"/>
-            <a:t>encontrar as substituições mais justas, levando em conta a disponibilidade da equipe para o dia do bloqueio e as regras de alocação.</a:t>
+            <a:t>ncontrar as substituições mais justas, levando em conta a disponibilidade da equipe para o dia do bloqueio e as regras de alocação.</a:t>
           </a:r>
           <a:endParaRPr lang="en-US" sz="2600" kern="1200" dirty="0"/>
         </a:p>
@@ -11771,10 +11826,10 @@
             <a:buChar char="•"/>
           </a:pPr>
           <a:r>
-            <a:rPr lang="pt-BR" sz="2800" kern="1200"/>
+            <a:rPr lang="pt-BR" sz="2800" kern="1200" dirty="0"/>
             <a:t>Dia comum - menor peso.</a:t>
           </a:r>
-          <a:endParaRPr lang="en-US" sz="2800" kern="1200"/>
+          <a:endParaRPr lang="en-US" sz="2800" kern="1200" dirty="0"/>
         </a:p>
         <a:p>
           <a:pPr marL="285750" lvl="1" indent="-285750" algn="l" defTabSz="1244600">
@@ -12037,13 +12092,42 @@
             <a:buChar char="•"/>
           </a:pPr>
           <a:r>
-            <a:rPr lang="pt-BR" sz="2800" kern="1200"/>
-            <a:t>Quanto menor o desvio padr</a:t>
+            <a:rPr lang="pt-BR" sz="2800" kern="1200" dirty="0"/>
+            <a:t>Quanto menor o desvio </a:t>
           </a:r>
           <a:r>
-            <a:rPr lang="en-US" sz="2800" kern="1200"/>
-            <a:t>ão mais justa é o conjunto de escalas</a:t>
+            <a:rPr lang="pt-BR" sz="2800" kern="1200" dirty="0" err="1"/>
+            <a:t>padr</a:t>
           </a:r>
+          <a:r>
+            <a:rPr lang="en-US" sz="2800" kern="1200" dirty="0" err="1"/>
+            <a:t>ão</a:t>
+          </a:r>
+          <a:r>
+            <a:rPr lang="en-US" sz="2800" kern="1200" dirty="0"/>
+            <a:t>, </a:t>
+          </a:r>
+          <a:r>
+            <a:rPr lang="en-US" sz="2800" kern="1200" dirty="0" err="1"/>
+            <a:t>mais</a:t>
+          </a:r>
+          <a:r>
+            <a:rPr lang="en-US" sz="2800" kern="1200" dirty="0"/>
+            <a:t> </a:t>
+          </a:r>
+          <a:r>
+            <a:rPr lang="en-US" sz="2800" kern="1200" dirty="0" err="1"/>
+            <a:t>justo</a:t>
+          </a:r>
+          <a:r>
+            <a:rPr lang="en-US" sz="2800" kern="1200" dirty="0"/>
+            <a:t> é o conjunto de </a:t>
+          </a:r>
+          <a:r>
+            <a:rPr lang="en-US" sz="2800" kern="1200" dirty="0" err="1"/>
+            <a:t>escalas</a:t>
+          </a:r>
+          <a:endParaRPr lang="en-US" sz="2800" kern="1200" dirty="0"/>
         </a:p>
       </dsp:txBody>
       <dsp:txXfrm>
@@ -12070,7 +12154,7 @@
       </dsp:nvSpPr>
       <dsp:spPr>
         <a:xfrm>
-          <a:off x="0" y="116232"/>
+          <a:off x="0" y="0"/>
           <a:ext cx="6666833" cy="1074060"/>
         </a:xfrm>
         <a:prstGeom prst="roundRect">
@@ -12159,7 +12243,7 @@
         </a:p>
       </dsp:txBody>
       <dsp:txXfrm>
-        <a:off x="52431" y="168663"/>
+        <a:off x="52431" y="52431"/>
         <a:ext cx="6561971" cy="969198"/>
       </dsp:txXfrm>
     </dsp:sp>
@@ -12170,7 +12254,7 @@
       </dsp:nvSpPr>
       <dsp:spPr>
         <a:xfrm>
-          <a:off x="0" y="1530789"/>
+          <a:off x="0" y="1247259"/>
           <a:ext cx="6666833" cy="1074060"/>
         </a:xfrm>
         <a:prstGeom prst="roundRect">
@@ -12259,7 +12343,7 @@
         </a:p>
       </dsp:txBody>
       <dsp:txXfrm>
-        <a:off x="52431" y="1583220"/>
+        <a:off x="52431" y="1299690"/>
         <a:ext cx="6561971" cy="969198"/>
       </dsp:txXfrm>
     </dsp:sp>
@@ -12270,7 +12354,7 @@
       </dsp:nvSpPr>
       <dsp:spPr>
         <a:xfrm>
-          <a:off x="0" y="3005448"/>
+          <a:off x="0" y="2466177"/>
           <a:ext cx="6666833" cy="1074060"/>
         </a:xfrm>
         <a:prstGeom prst="roundRect">
@@ -12359,7 +12443,7 @@
         </a:p>
       </dsp:txBody>
       <dsp:txXfrm>
-        <a:off x="52431" y="3057879"/>
+        <a:off x="52431" y="2518608"/>
         <a:ext cx="6561971" cy="969198"/>
       </dsp:txXfrm>
     </dsp:sp>
@@ -12370,8 +12454,8 @@
       </dsp:nvSpPr>
       <dsp:spPr>
         <a:xfrm>
-          <a:off x="0" y="4538368"/>
-          <a:ext cx="6666833" cy="950130"/>
+          <a:off x="0" y="4082899"/>
+          <a:ext cx="6666833" cy="1844369"/>
         </a:xfrm>
         <a:prstGeom prst="rect">
           <a:avLst/>
@@ -12414,14 +12498,14 @@
           </a:pPr>
           <a:r>
             <a:rPr lang="pt-BR" sz="2100" kern="1200" dirty="0"/>
-            <a:t>Pensamos que nesse caso deveria ser adicionada a média de horas trabalhadas até a data do seu ingresso na equipe, contudo esse problema não foi abordado.</a:t>
+            <a:t>	Pensamos que nesse caso deveria ser adicionada a média de horas trabalhadas até a data do seu ingresso na equipe ou ser calculada a escala a partir do momento da alteração da equipe, considerando o acumulado de horas de cada participante até o dado momento, contudo esse problema não foi abordado.</a:t>
           </a:r>
           <a:endParaRPr lang="en-US" sz="2100" kern="1200" dirty="0"/>
         </a:p>
       </dsp:txBody>
       <dsp:txXfrm>
-        <a:off x="0" y="4538368"/>
-        <a:ext cx="6666833" cy="950130"/>
+        <a:off x="0" y="4082899"/>
+        <a:ext cx="6666833" cy="1844369"/>
       </dsp:txXfrm>
     </dsp:sp>
   </dsp:spTree>
@@ -12577,7 +12661,7 @@
           </a:pPr>
           <a:r>
             <a:rPr lang="pt-BR" sz="1400" kern="1200" dirty="0"/>
-            <a:t>Tenho dúvidas se a solução do nosso “case” seria melhor resolvida por algoritmos genéticos, contudo entendo que o resultado final atendeu nossas expectativas.</a:t>
+            <a:t>TEMOS dúvidas se a solução do nosso “case” seria melhor resolvida por algoritmos genéticos, contudo entendo que o resultado final atendeu nossas expectativas.</a:t>
           </a:r>
           <a:endParaRPr lang="en-US" sz="1400" kern="1200" dirty="0"/>
         </a:p>
@@ -13027,10 +13111,10 @@
             <a:defRPr cap="all"/>
           </a:pPr>
           <a:r>
-            <a:rPr lang="pt-BR" sz="1300" kern="1200"/>
-            <a:t>Espero que tenham gostado do trabalho, exigiu bastante esforço do grupo.</a:t>
+            <a:rPr lang="pt-BR" sz="1300" kern="1200" dirty="0"/>
+            <a:t>ESPERAMOS que tenham gostado do trabalho, exigiu bastante esforço do grupo.</a:t>
           </a:r>
-          <a:endParaRPr lang="en-US" sz="1300" kern="1200"/>
+          <a:endParaRPr lang="en-US" sz="1300" kern="1200" dirty="0"/>
         </a:p>
       </dsp:txBody>
       <dsp:txXfrm>
@@ -26053,7 +26137,7 @@
           <a:p>
             <a:fld id="{CD5F919E-E50B-4A05-BA49-36982CD3E692}" type="datetimeFigureOut">
               <a:rPr lang="pt-BR" smtClean="0"/>
-              <a:t>10/04/2022</a:t>
+              <a:t>15/04/2022</a:t>
             </a:fld>
             <a:endParaRPr lang="pt-BR"/>
           </a:p>
@@ -26251,7 +26335,7 @@
           <a:p>
             <a:fld id="{CD5F919E-E50B-4A05-BA49-36982CD3E692}" type="datetimeFigureOut">
               <a:rPr lang="pt-BR" smtClean="0"/>
-              <a:t>10/04/2022</a:t>
+              <a:t>15/04/2022</a:t>
             </a:fld>
             <a:endParaRPr lang="pt-BR"/>
           </a:p>
@@ -26459,7 +26543,7 @@
           <a:p>
             <a:fld id="{CD5F919E-E50B-4A05-BA49-36982CD3E692}" type="datetimeFigureOut">
               <a:rPr lang="pt-BR" smtClean="0"/>
-              <a:t>10/04/2022</a:t>
+              <a:t>15/04/2022</a:t>
             </a:fld>
             <a:endParaRPr lang="pt-BR"/>
           </a:p>
@@ -26657,7 +26741,7 @@
           <a:p>
             <a:fld id="{CD5F919E-E50B-4A05-BA49-36982CD3E692}" type="datetimeFigureOut">
               <a:rPr lang="pt-BR" smtClean="0"/>
-              <a:t>10/04/2022</a:t>
+              <a:t>15/04/2022</a:t>
             </a:fld>
             <a:endParaRPr lang="pt-BR"/>
           </a:p>
@@ -26932,7 +27016,7 @@
           <a:p>
             <a:fld id="{CD5F919E-E50B-4A05-BA49-36982CD3E692}" type="datetimeFigureOut">
               <a:rPr lang="pt-BR" smtClean="0"/>
-              <a:t>10/04/2022</a:t>
+              <a:t>15/04/2022</a:t>
             </a:fld>
             <a:endParaRPr lang="pt-BR"/>
           </a:p>
@@ -27197,7 +27281,7 @@
           <a:p>
             <a:fld id="{CD5F919E-E50B-4A05-BA49-36982CD3E692}" type="datetimeFigureOut">
               <a:rPr lang="pt-BR" smtClean="0"/>
-              <a:t>10/04/2022</a:t>
+              <a:t>15/04/2022</a:t>
             </a:fld>
             <a:endParaRPr lang="pt-BR"/>
           </a:p>
@@ -27609,7 +27693,7 @@
           <a:p>
             <a:fld id="{CD5F919E-E50B-4A05-BA49-36982CD3E692}" type="datetimeFigureOut">
               <a:rPr lang="pt-BR" smtClean="0"/>
-              <a:t>10/04/2022</a:t>
+              <a:t>15/04/2022</a:t>
             </a:fld>
             <a:endParaRPr lang="pt-BR"/>
           </a:p>
@@ -27750,7 +27834,7 @@
           <a:p>
             <a:fld id="{CD5F919E-E50B-4A05-BA49-36982CD3E692}" type="datetimeFigureOut">
               <a:rPr lang="pt-BR" smtClean="0"/>
-              <a:t>10/04/2022</a:t>
+              <a:t>15/04/2022</a:t>
             </a:fld>
             <a:endParaRPr lang="pt-BR"/>
           </a:p>
@@ -27863,7 +27947,7 @@
           <a:p>
             <a:fld id="{CD5F919E-E50B-4A05-BA49-36982CD3E692}" type="datetimeFigureOut">
               <a:rPr lang="pt-BR" smtClean="0"/>
-              <a:t>10/04/2022</a:t>
+              <a:t>15/04/2022</a:t>
             </a:fld>
             <a:endParaRPr lang="pt-BR"/>
           </a:p>
@@ -28174,7 +28258,7 @@
           <a:p>
             <a:fld id="{CD5F919E-E50B-4A05-BA49-36982CD3E692}" type="datetimeFigureOut">
               <a:rPr lang="pt-BR" smtClean="0"/>
-              <a:t>10/04/2022</a:t>
+              <a:t>15/04/2022</a:t>
             </a:fld>
             <a:endParaRPr lang="pt-BR"/>
           </a:p>
@@ -28462,7 +28546,7 @@
           <a:p>
             <a:fld id="{CD5F919E-E50B-4A05-BA49-36982CD3E692}" type="datetimeFigureOut">
               <a:rPr lang="pt-BR" smtClean="0"/>
-              <a:t>10/04/2022</a:t>
+              <a:t>15/04/2022</a:t>
             </a:fld>
             <a:endParaRPr lang="pt-BR"/>
           </a:p>
@@ -28703,7 +28787,7 @@
           <a:p>
             <a:fld id="{CD5F919E-E50B-4A05-BA49-36982CD3E692}" type="datetimeFigureOut">
               <a:rPr lang="pt-BR" smtClean="0"/>
-              <a:t>10/04/2022</a:t>
+              <a:t>15/04/2022</a:t>
             </a:fld>
             <a:endParaRPr lang="pt-BR"/>
           </a:p>
@@ -29762,7 +29846,7 @@
             <a:pPr algn="r"/>
             <a:r>
               <a:rPr lang="pt-BR" sz="1400" dirty="0"/>
-              <a:t>Versão 0.9</a:t>
+              <a:t>Versão 1.0</a:t>
             </a:r>
           </a:p>
         </p:txBody>
@@ -30546,17 +30630,7 @@
           <a:p>
             <a:r>
               <a:rPr lang="pt-BR" sz="2400" dirty="0"/>
-              <a:t>Inexistência de “meia escala” </a:t>
-            </a:r>
-            <a:r>
-              <a:rPr lang="pt-BR" sz="2400" dirty="0">
-                <a:sym typeface="Wingdings" panose="05000000000000000000" pitchFamily="2" charset="2"/>
-              </a:rPr>
-              <a:t> </a:t>
-            </a:r>
-            <a:r>
-              <a:rPr lang="pt-BR" sz="2400" dirty="0"/>
-              <a:t>Um bloqueio pode gerar uma indisponibilidade para um dia e se não tratado gerar meia escala. </a:t>
+              <a:t>Inexistência de “meia escala” – uma jornada de sobreaviso dividida entre dois funcionários, potencialmente gerada por um bloqueio. </a:t>
             </a:r>
           </a:p>
           <a:p>
@@ -31300,7 +31374,7 @@
           <a:p>
             <a:r>
               <a:rPr lang="pt-BR" sz="2400" dirty="0"/>
-              <a:t>A grande quantidade de combinações possíveis e a complexidade das regras de restrição impediram o uso de funções randômicas “puras”. </a:t>
+              <a:t>A grande quantidade de combinações possíveis e a complexidade das regras de restrição impediram o uso de funções puramente aleatórias. </a:t>
             </a:r>
           </a:p>
           <a:p>
@@ -31309,7 +31383,7 @@
           <a:p>
             <a:r>
               <a:rPr lang="pt-BR" sz="2400" dirty="0"/>
-              <a:t>Como solução optamos por “controlar” as possibilidades para alocação de funcionários nos bloqueios, selecionando somente aqueles que estariam aptos a efetivamente trabalhar na escala.</a:t>
+              <a:t>Como solução, optamos por “controlar” as possibilidades para alocação de funcionários nos bloqueios, selecionando somente aqueles que estariam aptos a efetivamente trabalhar na escala.</a:t>
             </a:r>
           </a:p>
           <a:p>
@@ -31988,7 +32062,7 @@
             <p:ph idx="1"/>
             <p:extLst>
               <p:ext uri="{D42A27DB-BD31-4B8C-83A1-F6EECF244321}">
-                <p14:modId xmlns:p14="http://schemas.microsoft.com/office/powerpoint/2010/main" val="3226468948"/>
+                <p14:modId xmlns:p14="http://schemas.microsoft.com/office/powerpoint/2010/main" val="1209878106"/>
               </p:ext>
             </p:extLst>
           </p:nvPr>
@@ -32984,7 +33058,7 @@
             <p:ph idx="1"/>
             <p:extLst>
               <p:ext uri="{D42A27DB-BD31-4B8C-83A1-F6EECF244321}">
-                <p14:modId xmlns:p14="http://schemas.microsoft.com/office/powerpoint/2010/main" val="3343228231"/>
+                <p14:modId xmlns:p14="http://schemas.microsoft.com/office/powerpoint/2010/main" val="3393565162"/>
               </p:ext>
             </p:extLst>
           </p:nvPr>
@@ -35947,7 +36021,7 @@
             <p:ph idx="1"/>
             <p:extLst>
               <p:ext uri="{D42A27DB-BD31-4B8C-83A1-F6EECF244321}">
-                <p14:modId xmlns:p14="http://schemas.microsoft.com/office/powerpoint/2010/main" val="2971058534"/>
+                <p14:modId xmlns:p14="http://schemas.microsoft.com/office/powerpoint/2010/main" val="2374270672"/>
               </p:ext>
             </p:extLst>
           </p:nvPr>
@@ -36952,7 +37026,7 @@
           <a:p>
             <a:r>
               <a:rPr lang="pt-BR" sz="2000" dirty="0"/>
-              <a:t>Otimizar a busca pela solução mais justa utilizando algoritmos genéticos, onde cada individuo é um sobreaviso onde os bloqueios foram resolvidos</a:t>
+              <a:t>Otimizar a busca pela solução mais justa, utilizando algoritmos genéticos, onde cada individuo é um sobreaviso onde os bloqueios foram resolvidos</a:t>
             </a:r>
           </a:p>
         </p:txBody>
@@ -36972,7 +37046,7 @@
         <p:spPr>
           <a:xfrm>
             <a:off x="4338050" y="4613113"/>
-            <a:ext cx="3821915" cy="1622901"/>
+            <a:ext cx="3821915" cy="1631216"/>
           </a:xfrm>
           <a:prstGeom prst="rect">
             <a:avLst/>
@@ -36987,7 +37061,7 @@
           <a:p>
             <a:r>
               <a:rPr lang="pt-BR" sz="2000" dirty="0"/>
-              <a:t>Impossível encontrar a solução somente com opções randômicas, as combinações são quase infinitas e as funções de restrição muito complexas.</a:t>
+              <a:t>Impossível encontrar a solução somente com opções aleatórias, pois o espaço de busca é muito grande e as funções de restrição são muito complexas.</a:t>
             </a:r>
           </a:p>
         </p:txBody>
@@ -37632,7 +37706,7 @@
             <p:ph idx="1"/>
             <p:extLst>
               <p:ext uri="{D42A27DB-BD31-4B8C-83A1-F6EECF244321}">
-                <p14:modId xmlns:p14="http://schemas.microsoft.com/office/powerpoint/2010/main" val="2580539783"/>
+                <p14:modId xmlns:p14="http://schemas.microsoft.com/office/powerpoint/2010/main" val="3212667612"/>
               </p:ext>
             </p:extLst>
           </p:nvPr>

</xml_diff>